<commit_message>
Finish slides for today
</commit_message>
<xml_diff>
--- a/slides-and-notes/day-2-slides.pptx
+++ b/slides-and-notes/day-2-slides.pptx
@@ -5,7 +5,7 @@
     <p:sldMasterId id="2147483660" r:id="rId1"/>
   </p:sldMasterIdLst>
   <p:notesMasterIdLst>
-    <p:notesMasterId r:id="rId30"/>
+    <p:notesMasterId r:id="rId27"/>
   </p:notesMasterIdLst>
   <p:sldIdLst>
     <p:sldId id="256" r:id="rId2"/>
@@ -26,16 +26,13 @@
     <p:sldId id="424" r:id="rId17"/>
     <p:sldId id="422" r:id="rId18"/>
     <p:sldId id="423" r:id="rId19"/>
-    <p:sldId id="382" r:id="rId20"/>
-    <p:sldId id="409" r:id="rId21"/>
-    <p:sldId id="425" r:id="rId22"/>
-    <p:sldId id="429" r:id="rId23"/>
-    <p:sldId id="428" r:id="rId24"/>
-    <p:sldId id="427" r:id="rId25"/>
-    <p:sldId id="426" r:id="rId26"/>
-    <p:sldId id="430" r:id="rId27"/>
-    <p:sldId id="431" r:id="rId28"/>
-    <p:sldId id="432" r:id="rId29"/>
+    <p:sldId id="425" r:id="rId20"/>
+    <p:sldId id="429" r:id="rId21"/>
+    <p:sldId id="428" r:id="rId22"/>
+    <p:sldId id="427" r:id="rId23"/>
+    <p:sldId id="426" r:id="rId24"/>
+    <p:sldId id="430" r:id="rId25"/>
+    <p:sldId id="431" r:id="rId26"/>
   </p:sldIdLst>
   <p:sldSz cx="9144000" cy="6858000" type="screen4x3"/>
   <p:notesSz cx="6858000" cy="9144000"/>
@@ -4336,10 +4333,10 @@
           <p:nvPr/>
         </p:nvPicPr>
         <p:blipFill>
-          <a:blip r:embed="rId2">
+          <a:blip r:embed="rId2" cstate="email">
             <a:extLst>
               <a:ext uri="{28A0092B-C50C-407E-A947-70E740481C1C}">
-                <a14:useLocalDpi xmlns:a14="http://schemas.microsoft.com/office/drawing/2010/main" val="0"/>
+                <a14:useLocalDpi xmlns:a14="http://schemas.microsoft.com/office/drawing/2010/main"/>
               </a:ext>
             </a:extLst>
           </a:blip>
@@ -6325,14 +6322,6 @@
 <file path=ppt/slides/slide19.xml><?xml version="1.0" encoding="utf-8"?>
 <p:sld xmlns:a="http://schemas.openxmlformats.org/drawingml/2006/main" xmlns:r="http://schemas.openxmlformats.org/officeDocument/2006/relationships" xmlns:p="http://schemas.openxmlformats.org/presentationml/2006/main">
   <p:cSld>
-    <p:bg>
-      <p:bgPr>
-        <a:solidFill>
-          <a:srgbClr val="262626"/>
-        </a:solidFill>
-        <a:effectLst/>
-      </p:bgPr>
-    </p:bg>
     <p:spTree>
       <p:nvGrpSpPr>
         <p:cNvPr id="1" name=""/>
@@ -6349,10 +6338,10 @@
       </p:grpSpPr>
       <p:sp>
         <p:nvSpPr>
-          <p:cNvPr id="2" name="Rectangle 1">
+          <p:cNvPr id="4" name="Rectangle 3">
             <a:extLst>
               <a:ext uri="{FF2B5EF4-FFF2-40B4-BE49-F238E27FC236}">
-                <a16:creationId xmlns:a16="http://schemas.microsoft.com/office/drawing/2014/main" id="{57F5D2CC-05F3-724F-99CB-EAFD89DE97DB}"/>
+                <a16:creationId xmlns:a16="http://schemas.microsoft.com/office/drawing/2014/main" id="{F8EF8111-68F9-6A47-9458-B9975EF1737C}"/>
               </a:ext>
             </a:extLst>
           </p:cNvPr>
@@ -6361,47 +6350,135 @@
         </p:nvSpPr>
         <p:spPr>
           <a:xfrm>
-            <a:off x="2953608" y="2967335"/>
-            <a:ext cx="3236784" cy="923330"/>
+            <a:off x="316992" y="494188"/>
+            <a:ext cx="8506073" cy="830997"/>
           </a:xfrm>
           <a:prstGeom prst="rect">
             <a:avLst/>
           </a:prstGeom>
         </p:spPr>
         <p:txBody>
-          <a:bodyPr wrap="none">
+          <a:bodyPr wrap="square">
             <a:spAutoFit/>
           </a:bodyPr>
           <a:lstStyle/>
           <a:p>
             <a:r>
-              <a:rPr lang="en-GB" sz="5400" dirty="0">
-                <a:solidFill>
-                  <a:schemeClr val="accent5"/>
-                </a:solidFill>
-                <a:latin typeface="Consolas" panose="020B0609020204030204" pitchFamily="49" charset="0"/>
-                <a:cs typeface="Consolas" panose="020B0609020204030204" pitchFamily="49" charset="0"/>
-              </a:rPr>
-              <a:t>&gt; </a:t>
-            </a:r>
-            <a:r>
-              <a:rPr lang="en-US" sz="5400" dirty="0">
-                <a:solidFill>
-                  <a:schemeClr val="accent5"/>
-                </a:solidFill>
-                <a:latin typeface="Consolas" panose="020B0609020204030204" pitchFamily="49" charset="0"/>
-                <a:cs typeface="Consolas" panose="020B0609020204030204" pitchFamily="49" charset="0"/>
-              </a:rPr>
-              <a:t>demo()</a:t>
-            </a:r>
-            <a:endParaRPr lang="en-US" sz="5400" dirty="0"/>
+              <a:rPr lang="en-US" sz="2400" dirty="0">
+                <a:solidFill>
+                  <a:schemeClr val="accent5"/>
+                </a:solidFill>
+                <a:latin typeface="Consolas" panose="020B0609020204030204" pitchFamily="49" charset="0"/>
+                <a:cs typeface="Consolas" panose="020B0609020204030204" pitchFamily="49" charset="0"/>
+              </a:rPr>
+              <a:t>data %&gt;%</a:t>
+            </a:r>
+            <a:endParaRPr lang="en-US" sz="2400" dirty="0">
+              <a:solidFill>
+                <a:schemeClr val="accent4">
+                  <a:lumMod val="75000"/>
+                </a:schemeClr>
+              </a:solidFill>
+              <a:latin typeface="Consolas" panose="020B0609020204030204" pitchFamily="49" charset="0"/>
+              <a:cs typeface="Consolas" panose="020B0609020204030204" pitchFamily="49" charset="0"/>
+            </a:endParaRPr>
+          </a:p>
+          <a:p>
+            <a:r>
+              <a:rPr lang="en-US" sz="2400" dirty="0">
+                <a:solidFill>
+                  <a:schemeClr val="accent5"/>
+                </a:solidFill>
+                <a:latin typeface="Consolas" panose="020B0609020204030204" pitchFamily="49" charset="0"/>
+                <a:cs typeface="Consolas" panose="020B0609020204030204" pitchFamily="49" charset="0"/>
+              </a:rPr>
+              <a:t>  filter(...)</a:t>
+            </a:r>
           </a:p>
         </p:txBody>
       </p:sp>
+      <p:sp>
+        <p:nvSpPr>
+          <p:cNvPr id="5" name="TextBox 4">
+            <a:extLst>
+              <a:ext uri="{FF2B5EF4-FFF2-40B4-BE49-F238E27FC236}">
+                <a16:creationId xmlns:a16="http://schemas.microsoft.com/office/drawing/2014/main" id="{81BCB3FE-B672-4F48-BF47-718AD82D6478}"/>
+              </a:ext>
+            </a:extLst>
+          </p:cNvPr>
+          <p:cNvSpPr txBox="1"/>
+          <p:nvPr/>
+        </p:nvSpPr>
+        <p:spPr>
+          <a:xfrm>
+            <a:off x="0" y="6618210"/>
+            <a:ext cx="3020379" cy="215444"/>
+          </a:xfrm>
+          <a:prstGeom prst="rect">
+            <a:avLst/>
+          </a:prstGeom>
+          <a:noFill/>
+        </p:spPr>
+        <p:txBody>
+          <a:bodyPr wrap="none" rtlCol="0">
+            <a:spAutoFit/>
+          </a:bodyPr>
+          <a:lstStyle/>
+          <a:p>
+            <a:r>
+              <a:rPr lang="en-GB" sz="800" dirty="0"/>
+              <a:t>CC BY SA RStudio </a:t>
+            </a:r>
+            <a:r>
+              <a:rPr lang="en-GB" sz="800" dirty="0">
+                <a:hlinkClick r:id="rId2"/>
+              </a:rPr>
+              <a:t>https://www.rstudio.com/resources/cheatsheets/</a:t>
+            </a:r>
+            <a:endParaRPr lang="en-US" sz="800" dirty="0"/>
+          </a:p>
+        </p:txBody>
+      </p:sp>
+      <p:pic>
+        <p:nvPicPr>
+          <p:cNvPr id="6" name="Picture 5">
+            <a:extLst>
+              <a:ext uri="{FF2B5EF4-FFF2-40B4-BE49-F238E27FC236}">
+                <a16:creationId xmlns:a16="http://schemas.microsoft.com/office/drawing/2014/main" id="{67FD4891-C276-B844-BE8C-6A7D5BD5AFEB}"/>
+              </a:ext>
+            </a:extLst>
+          </p:cNvPr>
+          <p:cNvPicPr>
+            <a:picLocks noChangeAspect="1"/>
+          </p:cNvPicPr>
+          <p:nvPr/>
+        </p:nvPicPr>
+        <p:blipFill>
+          <a:blip r:embed="rId3" cstate="email">
+            <a:extLst>
+              <a:ext uri="{28A0092B-C50C-407E-A947-70E740481C1C}">
+                <a14:useLocalDpi xmlns:a14="http://schemas.microsoft.com/office/drawing/2010/main"/>
+              </a:ext>
+            </a:extLst>
+          </a:blip>
+          <a:stretch>
+            <a:fillRect/>
+          </a:stretch>
+        </p:blipFill>
+        <p:spPr>
+          <a:xfrm>
+            <a:off x="1261367" y="1650528"/>
+            <a:ext cx="6976924" cy="4642338"/>
+          </a:xfrm>
+          <a:prstGeom prst="rect">
+            <a:avLst/>
+          </a:prstGeom>
+        </p:spPr>
+      </p:pic>
     </p:spTree>
     <p:extLst>
       <p:ext uri="{BB962C8B-B14F-4D97-AF65-F5344CB8AC3E}">
-        <p14:creationId xmlns:p14="http://schemas.microsoft.com/office/powerpoint/2010/main" val="2398727393"/>
+        <p14:creationId xmlns:p14="http://schemas.microsoft.com/office/powerpoint/2010/main" val="3929270810"/>
       </p:ext>
     </p:extLst>
   </p:cSld>
@@ -6579,343 +6656,6 @@
 <file path=ppt/slides/slide20.xml><?xml version="1.0" encoding="utf-8"?>
 <p:sld xmlns:a="http://schemas.openxmlformats.org/drawingml/2006/main" xmlns:r="http://schemas.openxmlformats.org/officeDocument/2006/relationships" xmlns:p="http://schemas.openxmlformats.org/presentationml/2006/main">
   <p:cSld>
-    <p:bg>
-      <p:bgPr>
-        <a:solidFill>
-          <a:srgbClr val="262626"/>
-        </a:solidFill>
-        <a:effectLst/>
-      </p:bgPr>
-    </p:bg>
-    <p:spTree>
-      <p:nvGrpSpPr>
-        <p:cNvPr id="1" name=""/>
-        <p:cNvGrpSpPr/>
-        <p:nvPr/>
-      </p:nvGrpSpPr>
-      <p:grpSpPr>
-        <a:xfrm>
-          <a:off x="0" y="0"/>
-          <a:ext cx="0" cy="0"/>
-          <a:chOff x="0" y="0"/>
-          <a:chExt cx="0" cy="0"/>
-        </a:xfrm>
-      </p:grpSpPr>
-      <p:sp>
-        <p:nvSpPr>
-          <p:cNvPr id="2" name="Rectangle 1">
-            <a:extLst>
-              <a:ext uri="{FF2B5EF4-FFF2-40B4-BE49-F238E27FC236}">
-                <a16:creationId xmlns:a16="http://schemas.microsoft.com/office/drawing/2014/main" id="{57F5D2CC-05F3-724F-99CB-EAFD89DE97DB}"/>
-              </a:ext>
-            </a:extLst>
-          </p:cNvPr>
-          <p:cNvSpPr/>
-          <p:nvPr/>
-        </p:nvSpPr>
-        <p:spPr>
-          <a:xfrm>
-            <a:off x="2953608" y="2967335"/>
-            <a:ext cx="3236784" cy="923330"/>
-          </a:xfrm>
-          <a:prstGeom prst="rect">
-            <a:avLst/>
-          </a:prstGeom>
-        </p:spPr>
-        <p:txBody>
-          <a:bodyPr wrap="none">
-            <a:spAutoFit/>
-          </a:bodyPr>
-          <a:lstStyle/>
-          <a:p>
-            <a:r>
-              <a:rPr lang="en-GB" sz="5400" dirty="0">
-                <a:solidFill>
-                  <a:schemeClr val="accent5"/>
-                </a:solidFill>
-                <a:latin typeface="Consolas" panose="020B0609020204030204" pitchFamily="49" charset="0"/>
-                <a:cs typeface="Consolas" panose="020B0609020204030204" pitchFamily="49" charset="0"/>
-              </a:rPr>
-              <a:t>&gt; </a:t>
-            </a:r>
-            <a:r>
-              <a:rPr lang="en-US" sz="5400" dirty="0">
-                <a:solidFill>
-                  <a:schemeClr val="accent5"/>
-                </a:solidFill>
-                <a:latin typeface="Consolas" panose="020B0609020204030204" pitchFamily="49" charset="0"/>
-                <a:cs typeface="Consolas" panose="020B0609020204030204" pitchFamily="49" charset="0"/>
-              </a:rPr>
-              <a:t>demo()</a:t>
-            </a:r>
-            <a:endParaRPr lang="en-US" sz="5400" dirty="0"/>
-          </a:p>
-        </p:txBody>
-      </p:sp>
-      <p:sp>
-        <p:nvSpPr>
-          <p:cNvPr id="4" name="Rectangle 3">
-            <a:extLst>
-              <a:ext uri="{FF2B5EF4-FFF2-40B4-BE49-F238E27FC236}">
-                <a16:creationId xmlns:a16="http://schemas.microsoft.com/office/drawing/2014/main" id="{AB8D8A53-FE01-054C-A694-3F5C5AF7A65B}"/>
-              </a:ext>
-            </a:extLst>
-          </p:cNvPr>
-          <p:cNvSpPr/>
-          <p:nvPr/>
-        </p:nvSpPr>
-        <p:spPr>
-          <a:xfrm>
-            <a:off x="4096549" y="5087333"/>
-            <a:ext cx="543739" cy="523220"/>
-          </a:xfrm>
-          <a:prstGeom prst="rect">
-            <a:avLst/>
-          </a:prstGeom>
-        </p:spPr>
-        <p:txBody>
-          <a:bodyPr wrap="none">
-            <a:spAutoFit/>
-          </a:bodyPr>
-          <a:lstStyle/>
-          <a:p>
-            <a:r>
-              <a:rPr lang="en-US" sz="2800" dirty="0">
-                <a:solidFill>
-                  <a:schemeClr val="bg1"/>
-                </a:solidFill>
-                <a:latin typeface="Avenir Book" panose="02000503020000020003" pitchFamily="2" charset="0"/>
-              </a:rPr>
-              <a:t>…</a:t>
-            </a:r>
-          </a:p>
-        </p:txBody>
-      </p:sp>
-      <p:sp>
-        <p:nvSpPr>
-          <p:cNvPr id="7" name="TextBox 6">
-            <a:extLst>
-              <a:ext uri="{FF2B5EF4-FFF2-40B4-BE49-F238E27FC236}">
-                <a16:creationId xmlns:a16="http://schemas.microsoft.com/office/drawing/2014/main" id="{8B33FF2F-8CF6-9945-BF7A-3296428E2C34}"/>
-              </a:ext>
-            </a:extLst>
-          </p:cNvPr>
-          <p:cNvSpPr txBox="1"/>
-          <p:nvPr/>
-        </p:nvSpPr>
-        <p:spPr>
-          <a:xfrm>
-            <a:off x="486137" y="4995000"/>
-            <a:ext cx="2807948" cy="707886"/>
-          </a:xfrm>
-          <a:prstGeom prst="rect">
-            <a:avLst/>
-          </a:prstGeom>
-          <a:noFill/>
-        </p:spPr>
-        <p:txBody>
-          <a:bodyPr wrap="none" rtlCol="0">
-            <a:spAutoFit/>
-          </a:bodyPr>
-          <a:lstStyle/>
-          <a:p>
-            <a:r>
-              <a:rPr lang="en-US" sz="4000" dirty="0">
-                <a:solidFill>
-                  <a:schemeClr val="bg1"/>
-                </a:solidFill>
-                <a:latin typeface="Avenir Book" panose="02000503020000020003" pitchFamily="2" charset="0"/>
-              </a:rPr>
-              <a:t>DATASETS:</a:t>
-            </a:r>
-          </a:p>
-        </p:txBody>
-      </p:sp>
-    </p:spTree>
-    <p:extLst>
-      <p:ext uri="{BB962C8B-B14F-4D97-AF65-F5344CB8AC3E}">
-        <p14:creationId xmlns:p14="http://schemas.microsoft.com/office/powerpoint/2010/main" val="1316379569"/>
-      </p:ext>
-    </p:extLst>
-  </p:cSld>
-  <p:clrMapOvr>
-    <a:masterClrMapping/>
-  </p:clrMapOvr>
-</p:sld>
-</file>
-
-<file path=ppt/slides/slide21.xml><?xml version="1.0" encoding="utf-8"?>
-<p:sld xmlns:a="http://schemas.openxmlformats.org/drawingml/2006/main" xmlns:r="http://schemas.openxmlformats.org/officeDocument/2006/relationships" xmlns:p="http://schemas.openxmlformats.org/presentationml/2006/main">
-  <p:cSld>
-    <p:spTree>
-      <p:nvGrpSpPr>
-        <p:cNvPr id="1" name=""/>
-        <p:cNvGrpSpPr/>
-        <p:nvPr/>
-      </p:nvGrpSpPr>
-      <p:grpSpPr>
-        <a:xfrm>
-          <a:off x="0" y="0"/>
-          <a:ext cx="0" cy="0"/>
-          <a:chOff x="0" y="0"/>
-          <a:chExt cx="0" cy="0"/>
-        </a:xfrm>
-      </p:grpSpPr>
-      <p:sp>
-        <p:nvSpPr>
-          <p:cNvPr id="4" name="Rectangle 3">
-            <a:extLst>
-              <a:ext uri="{FF2B5EF4-FFF2-40B4-BE49-F238E27FC236}">
-                <a16:creationId xmlns:a16="http://schemas.microsoft.com/office/drawing/2014/main" id="{F8EF8111-68F9-6A47-9458-B9975EF1737C}"/>
-              </a:ext>
-            </a:extLst>
-          </p:cNvPr>
-          <p:cNvSpPr/>
-          <p:nvPr/>
-        </p:nvSpPr>
-        <p:spPr>
-          <a:xfrm>
-            <a:off x="316992" y="494188"/>
-            <a:ext cx="8506073" cy="830997"/>
-          </a:xfrm>
-          <a:prstGeom prst="rect">
-            <a:avLst/>
-          </a:prstGeom>
-        </p:spPr>
-        <p:txBody>
-          <a:bodyPr wrap="square">
-            <a:spAutoFit/>
-          </a:bodyPr>
-          <a:lstStyle/>
-          <a:p>
-            <a:r>
-              <a:rPr lang="en-US" sz="2400" dirty="0">
-                <a:solidFill>
-                  <a:schemeClr val="accent5"/>
-                </a:solidFill>
-                <a:latin typeface="Consolas" panose="020B0609020204030204" pitchFamily="49" charset="0"/>
-                <a:cs typeface="Consolas" panose="020B0609020204030204" pitchFamily="49" charset="0"/>
-              </a:rPr>
-              <a:t>data %&gt;%</a:t>
-            </a:r>
-            <a:endParaRPr lang="en-US" sz="2400" dirty="0">
-              <a:solidFill>
-                <a:schemeClr val="accent4">
-                  <a:lumMod val="75000"/>
-                </a:schemeClr>
-              </a:solidFill>
-              <a:latin typeface="Consolas" panose="020B0609020204030204" pitchFamily="49" charset="0"/>
-              <a:cs typeface="Consolas" panose="020B0609020204030204" pitchFamily="49" charset="0"/>
-            </a:endParaRPr>
-          </a:p>
-          <a:p>
-            <a:r>
-              <a:rPr lang="en-US" sz="2400" dirty="0">
-                <a:solidFill>
-                  <a:schemeClr val="accent5"/>
-                </a:solidFill>
-                <a:latin typeface="Consolas" panose="020B0609020204030204" pitchFamily="49" charset="0"/>
-                <a:cs typeface="Consolas" panose="020B0609020204030204" pitchFamily="49" charset="0"/>
-              </a:rPr>
-              <a:t>  filter(...)</a:t>
-            </a:r>
-          </a:p>
-        </p:txBody>
-      </p:sp>
-      <p:sp>
-        <p:nvSpPr>
-          <p:cNvPr id="5" name="TextBox 4">
-            <a:extLst>
-              <a:ext uri="{FF2B5EF4-FFF2-40B4-BE49-F238E27FC236}">
-                <a16:creationId xmlns:a16="http://schemas.microsoft.com/office/drawing/2014/main" id="{81BCB3FE-B672-4F48-BF47-718AD82D6478}"/>
-              </a:ext>
-            </a:extLst>
-          </p:cNvPr>
-          <p:cNvSpPr txBox="1"/>
-          <p:nvPr/>
-        </p:nvSpPr>
-        <p:spPr>
-          <a:xfrm>
-            <a:off x="0" y="6618210"/>
-            <a:ext cx="3020379" cy="215444"/>
-          </a:xfrm>
-          <a:prstGeom prst="rect">
-            <a:avLst/>
-          </a:prstGeom>
-          <a:noFill/>
-        </p:spPr>
-        <p:txBody>
-          <a:bodyPr wrap="none" rtlCol="0">
-            <a:spAutoFit/>
-          </a:bodyPr>
-          <a:lstStyle/>
-          <a:p>
-            <a:r>
-              <a:rPr lang="en-GB" sz="800" dirty="0"/>
-              <a:t>CC BY SA RStudio </a:t>
-            </a:r>
-            <a:r>
-              <a:rPr lang="en-GB" sz="800" dirty="0">
-                <a:hlinkClick r:id="rId2"/>
-              </a:rPr>
-              <a:t>https://www.rstudio.com/resources/cheatsheets/</a:t>
-            </a:r>
-            <a:endParaRPr lang="en-US" sz="800" dirty="0"/>
-          </a:p>
-        </p:txBody>
-      </p:sp>
-      <p:pic>
-        <p:nvPicPr>
-          <p:cNvPr id="6" name="Picture 5">
-            <a:extLst>
-              <a:ext uri="{FF2B5EF4-FFF2-40B4-BE49-F238E27FC236}">
-                <a16:creationId xmlns:a16="http://schemas.microsoft.com/office/drawing/2014/main" id="{67FD4891-C276-B844-BE8C-6A7D5BD5AFEB}"/>
-              </a:ext>
-            </a:extLst>
-          </p:cNvPr>
-          <p:cNvPicPr>
-            <a:picLocks noChangeAspect="1"/>
-          </p:cNvPicPr>
-          <p:nvPr/>
-        </p:nvPicPr>
-        <p:blipFill>
-          <a:blip r:embed="rId3">
-            <a:extLst>
-              <a:ext uri="{28A0092B-C50C-407E-A947-70E740481C1C}">
-                <a14:useLocalDpi xmlns:a14="http://schemas.microsoft.com/office/drawing/2010/main" val="0"/>
-              </a:ext>
-            </a:extLst>
-          </a:blip>
-          <a:stretch>
-            <a:fillRect/>
-          </a:stretch>
-        </p:blipFill>
-        <p:spPr>
-          <a:xfrm>
-            <a:off x="1261367" y="1650528"/>
-            <a:ext cx="6976924" cy="4642338"/>
-          </a:xfrm>
-          <a:prstGeom prst="rect">
-            <a:avLst/>
-          </a:prstGeom>
-        </p:spPr>
-      </p:pic>
-    </p:spTree>
-    <p:extLst>
-      <p:ext uri="{BB962C8B-B14F-4D97-AF65-F5344CB8AC3E}">
-        <p14:creationId xmlns:p14="http://schemas.microsoft.com/office/powerpoint/2010/main" val="3929270810"/>
-      </p:ext>
-    </p:extLst>
-  </p:cSld>
-  <p:clrMapOvr>
-    <a:masterClrMapping/>
-  </p:clrMapOvr>
-</p:sld>
-</file>
-
-<file path=ppt/slides/slide22.xml><?xml version="1.0" encoding="utf-8"?>
-<p:sld xmlns:a="http://schemas.openxmlformats.org/drawingml/2006/main" xmlns:r="http://schemas.openxmlformats.org/officeDocument/2006/relationships" xmlns:p="http://schemas.openxmlformats.org/presentationml/2006/main">
-  <p:cSld>
     <p:spTree>
       <p:nvGrpSpPr>
         <p:cNvPr id="1" name=""/>
@@ -7028,7 +6768,7 @@
 </p:sld>
 </file>
 
-<file path=ppt/slides/slide23.xml><?xml version="1.0" encoding="utf-8"?>
+<file path=ppt/slides/slide21.xml><?xml version="1.0" encoding="utf-8"?>
 <p:sld xmlns:a="http://schemas.openxmlformats.org/drawingml/2006/main" xmlns:r="http://schemas.openxmlformats.org/officeDocument/2006/relationships" xmlns:p="http://schemas.openxmlformats.org/presentationml/2006/main">
   <p:cSld>
     <p:spTree>
@@ -7240,7 +6980,7 @@
 </p:sld>
 </file>
 
-<file path=ppt/slides/slide24.xml><?xml version="1.0" encoding="utf-8"?>
+<file path=ppt/slides/slide22.xml><?xml version="1.0" encoding="utf-8"?>
 <p:sld xmlns:a="http://schemas.openxmlformats.org/drawingml/2006/main" xmlns:r="http://schemas.openxmlformats.org/officeDocument/2006/relationships" xmlns:p="http://schemas.openxmlformats.org/presentationml/2006/main">
   <p:cSld>
     <p:spTree>
@@ -7519,7 +7259,7 @@
                 <a:latin typeface="Consolas" panose="020B0609020204030204" pitchFamily="49" charset="0"/>
                 <a:cs typeface="Consolas" panose="020B0609020204030204" pitchFamily="49" charset="0"/>
               </a:rPr>
-              <a:t> &amp;&amp;</a:t>
+              <a:t> &amp;</a:t>
             </a:r>
             <a:r>
               <a:rPr lang="en-US" sz="2400" dirty="0">
@@ -7568,7 +7308,7 @@
 </p:sld>
 </file>
 
-<file path=ppt/slides/slide25.xml><?xml version="1.0" encoding="utf-8"?>
+<file path=ppt/slides/slide23.xml><?xml version="1.0" encoding="utf-8"?>
 <p:sld xmlns:a="http://schemas.openxmlformats.org/drawingml/2006/main" xmlns:r="http://schemas.openxmlformats.org/officeDocument/2006/relationships" xmlns:p="http://schemas.openxmlformats.org/presentationml/2006/main">
   <p:cSld>
     <p:spTree>
@@ -7790,7 +7530,7 @@
                 <a:latin typeface="Consolas" panose="020B0609020204030204" pitchFamily="49" charset="0"/>
                 <a:cs typeface="Consolas" panose="020B0609020204030204" pitchFamily="49" charset="0"/>
               </a:rPr>
-              <a:t># So it "&amp;&amp;"s them, so it would be the same as:</a:t>
+              <a:t># So it "&amp;"s them, so it would be the same as:</a:t>
             </a:r>
           </a:p>
           <a:p>
@@ -7847,7 +7587,7 @@
                 <a:latin typeface="Consolas" panose="020B0609020204030204" pitchFamily="49" charset="0"/>
                 <a:cs typeface="Consolas" panose="020B0609020204030204" pitchFamily="49" charset="0"/>
               </a:rPr>
-              <a:t> &amp;&amp;</a:t>
+              <a:t> &amp;</a:t>
             </a:r>
             <a:r>
               <a:rPr lang="en-US" sz="2400" dirty="0">
@@ -7946,7 +7686,7 @@
                 <a:latin typeface="Consolas" panose="020B0609020204030204" pitchFamily="49" charset="0"/>
                 <a:cs typeface="Consolas" panose="020B0609020204030204" pitchFamily="49" charset="0"/>
               </a:rPr>
-              <a:t>|| </a:t>
+              <a:t>| </a:t>
             </a:r>
             <a:r>
               <a:rPr lang="en-US" sz="2400" dirty="0" err="1">
@@ -7984,7 +7724,7 @@
                 <a:latin typeface="Consolas" panose="020B0609020204030204" pitchFamily="49" charset="0"/>
                 <a:cs typeface="Consolas" panose="020B0609020204030204" pitchFamily="49" charset="0"/>
               </a:rPr>
-              <a:t># We can use "or": ||</a:t>
+              <a:t># We can use "or": |</a:t>
             </a:r>
           </a:p>
           <a:p>
@@ -8013,7 +7753,7 @@
 </p:sld>
 </file>
 
-<file path=ppt/slides/slide26.xml><?xml version="1.0" encoding="utf-8"?>
+<file path=ppt/slides/slide24.xml><?xml version="1.0" encoding="utf-8"?>
 <p:sld xmlns:a="http://schemas.openxmlformats.org/drawingml/2006/main" xmlns:r="http://schemas.openxmlformats.org/officeDocument/2006/relationships" xmlns:p="http://schemas.openxmlformats.org/presentationml/2006/main">
   <p:cSld>
     <p:spTree>
@@ -8133,7 +7873,7 @@
                 <a:latin typeface="Consolas" panose="020B0609020204030204" pitchFamily="49" charset="0"/>
                 <a:cs typeface="Consolas" panose="020B0609020204030204" pitchFamily="49" charset="0"/>
               </a:rPr>
-              <a:t>&amp;&amp;</a:t>
+              <a:t>&amp;</a:t>
             </a:r>
             <a:r>
               <a:rPr lang="en-US" sz="2400" dirty="0">
@@ -8269,7 +8009,7 @@
 </p:sld>
 </file>
 
-<file path=ppt/slides/slide27.xml><?xml version="1.0" encoding="utf-8"?>
+<file path=ppt/slides/slide25.xml><?xml version="1.0" encoding="utf-8"?>
 <p:sld xmlns:a="http://schemas.openxmlformats.org/drawingml/2006/main" xmlns:r="http://schemas.openxmlformats.org/officeDocument/2006/relationships" xmlns:p="http://schemas.openxmlformats.org/presentationml/2006/main">
   <p:cSld>
     <p:bg>
@@ -8349,174 +8089,6 @@
     <p:extLst>
       <p:ext uri="{BB962C8B-B14F-4D97-AF65-F5344CB8AC3E}">
         <p14:creationId xmlns:p14="http://schemas.microsoft.com/office/powerpoint/2010/main" val="1932194392"/>
-      </p:ext>
-    </p:extLst>
-  </p:cSld>
-  <p:clrMapOvr>
-    <a:masterClrMapping/>
-  </p:clrMapOvr>
-</p:sld>
-</file>
-
-<file path=ppt/slides/slide28.xml><?xml version="1.0" encoding="utf-8"?>
-<p:sld xmlns:a="http://schemas.openxmlformats.org/drawingml/2006/main" xmlns:r="http://schemas.openxmlformats.org/officeDocument/2006/relationships" xmlns:p="http://schemas.openxmlformats.org/presentationml/2006/main">
-  <p:cSld>
-    <p:bg>
-      <p:bgPr>
-        <a:solidFill>
-          <a:srgbClr val="262626"/>
-        </a:solidFill>
-        <a:effectLst/>
-      </p:bgPr>
-    </p:bg>
-    <p:spTree>
-      <p:nvGrpSpPr>
-        <p:cNvPr id="1" name=""/>
-        <p:cNvGrpSpPr/>
-        <p:nvPr/>
-      </p:nvGrpSpPr>
-      <p:grpSpPr>
-        <a:xfrm>
-          <a:off x="0" y="0"/>
-          <a:ext cx="0" cy="0"/>
-          <a:chOff x="0" y="0"/>
-          <a:chExt cx="0" cy="0"/>
-        </a:xfrm>
-      </p:grpSpPr>
-      <p:sp>
-        <p:nvSpPr>
-          <p:cNvPr id="2" name="Rectangle 1">
-            <a:extLst>
-              <a:ext uri="{FF2B5EF4-FFF2-40B4-BE49-F238E27FC236}">
-                <a16:creationId xmlns:a16="http://schemas.microsoft.com/office/drawing/2014/main" id="{57F5D2CC-05F3-724F-99CB-EAFD89DE97DB}"/>
-              </a:ext>
-            </a:extLst>
-          </p:cNvPr>
-          <p:cNvSpPr/>
-          <p:nvPr/>
-        </p:nvSpPr>
-        <p:spPr>
-          <a:xfrm>
-            <a:off x="2953608" y="2967335"/>
-            <a:ext cx="3236784" cy="923330"/>
-          </a:xfrm>
-          <a:prstGeom prst="rect">
-            <a:avLst/>
-          </a:prstGeom>
-        </p:spPr>
-        <p:txBody>
-          <a:bodyPr wrap="none">
-            <a:spAutoFit/>
-          </a:bodyPr>
-          <a:lstStyle/>
-          <a:p>
-            <a:r>
-              <a:rPr lang="en-GB" sz="5400" dirty="0">
-                <a:solidFill>
-                  <a:schemeClr val="accent5"/>
-                </a:solidFill>
-                <a:latin typeface="Consolas" panose="020B0609020204030204" pitchFamily="49" charset="0"/>
-                <a:cs typeface="Consolas" panose="020B0609020204030204" pitchFamily="49" charset="0"/>
-              </a:rPr>
-              <a:t>&gt; </a:t>
-            </a:r>
-            <a:r>
-              <a:rPr lang="en-US" sz="5400" dirty="0">
-                <a:solidFill>
-                  <a:schemeClr val="accent5"/>
-                </a:solidFill>
-                <a:latin typeface="Consolas" panose="020B0609020204030204" pitchFamily="49" charset="0"/>
-                <a:cs typeface="Consolas" panose="020B0609020204030204" pitchFamily="49" charset="0"/>
-              </a:rPr>
-              <a:t>demo()</a:t>
-            </a:r>
-            <a:endParaRPr lang="en-US" sz="5400" dirty="0"/>
-          </a:p>
-        </p:txBody>
-      </p:sp>
-      <p:sp>
-        <p:nvSpPr>
-          <p:cNvPr id="4" name="Rectangle 3">
-            <a:extLst>
-              <a:ext uri="{FF2B5EF4-FFF2-40B4-BE49-F238E27FC236}">
-                <a16:creationId xmlns:a16="http://schemas.microsoft.com/office/drawing/2014/main" id="{AB8D8A53-FE01-054C-A694-3F5C5AF7A65B}"/>
-              </a:ext>
-            </a:extLst>
-          </p:cNvPr>
-          <p:cNvSpPr/>
-          <p:nvPr/>
-        </p:nvSpPr>
-        <p:spPr>
-          <a:xfrm>
-            <a:off x="4096549" y="5087333"/>
-            <a:ext cx="543739" cy="523220"/>
-          </a:xfrm>
-          <a:prstGeom prst="rect">
-            <a:avLst/>
-          </a:prstGeom>
-        </p:spPr>
-        <p:txBody>
-          <a:bodyPr wrap="none">
-            <a:spAutoFit/>
-          </a:bodyPr>
-          <a:lstStyle/>
-          <a:p>
-            <a:r>
-              <a:rPr lang="en-US" sz="2800" dirty="0">
-                <a:solidFill>
-                  <a:schemeClr val="bg1"/>
-                </a:solidFill>
-                <a:latin typeface="Avenir Book" panose="02000503020000020003" pitchFamily="2" charset="0"/>
-              </a:rPr>
-              <a:t>…</a:t>
-            </a:r>
-          </a:p>
-        </p:txBody>
-      </p:sp>
-      <p:sp>
-        <p:nvSpPr>
-          <p:cNvPr id="7" name="TextBox 6">
-            <a:extLst>
-              <a:ext uri="{FF2B5EF4-FFF2-40B4-BE49-F238E27FC236}">
-                <a16:creationId xmlns:a16="http://schemas.microsoft.com/office/drawing/2014/main" id="{8B33FF2F-8CF6-9945-BF7A-3296428E2C34}"/>
-              </a:ext>
-            </a:extLst>
-          </p:cNvPr>
-          <p:cNvSpPr txBox="1"/>
-          <p:nvPr/>
-        </p:nvSpPr>
-        <p:spPr>
-          <a:xfrm>
-            <a:off x="486137" y="4995000"/>
-            <a:ext cx="2807948" cy="707886"/>
-          </a:xfrm>
-          <a:prstGeom prst="rect">
-            <a:avLst/>
-          </a:prstGeom>
-          <a:noFill/>
-        </p:spPr>
-        <p:txBody>
-          <a:bodyPr wrap="none" rtlCol="0">
-            <a:spAutoFit/>
-          </a:bodyPr>
-          <a:lstStyle/>
-          <a:p>
-            <a:r>
-              <a:rPr lang="en-US" sz="4000" dirty="0">
-                <a:solidFill>
-                  <a:schemeClr val="bg1"/>
-                </a:solidFill>
-                <a:latin typeface="Avenir Book" panose="02000503020000020003" pitchFamily="2" charset="0"/>
-              </a:rPr>
-              <a:t>DATASETS:</a:t>
-            </a:r>
-          </a:p>
-        </p:txBody>
-      </p:sp>
-    </p:spTree>
-    <p:extLst>
-      <p:ext uri="{BB962C8B-B14F-4D97-AF65-F5344CB8AC3E}">
-        <p14:creationId xmlns:p14="http://schemas.microsoft.com/office/powerpoint/2010/main" val="189345634"/>
       </p:ext>
     </p:extLst>
   </p:cSld>

</xml_diff>